<commit_message>
update main toc and db section
</commit_message>
<xml_diff>
--- a/threads/threads.pptx
+++ b/threads/threads.pptx
@@ -1290,7 +1290,7 @@
             </a:r>
             <a:r>
               <a:rPr lang="da-DK" dirty="0"/>
-              <a:t> – uge 2</a:t>
+              <a:t> – uge 3</a:t>
             </a:r>
             <a:endParaRPr lang="en-US" dirty="0"/>
           </a:p>
@@ -2001,7 +2001,7 @@
             </a:pPr>
             <a:r>
               <a:rPr lang="da-DK" dirty="0"/>
-              <a:t>Kasper tegner på tavlen for at pointere ideen om at</a:t>
+              <a:t>Underviseren tegner på tavlen for at pointere ideen om at</a:t>
             </a:r>
           </a:p>
           <a:p>
@@ -2181,7 +2181,7 @@
             </a:r>
             <a:r>
               <a:rPr lang="da-DK" dirty="0"/>
-              <a:t> metoden bruges i eksempel kode til at illustrere at ”her gør tråden noget der tager tid, som vi ikke orker at kode lige her”.</a:t>
+              <a:t> metoden bruges i eksempel-kode til at illustrere at ”her gør tråden noget der tager tid, som vi ikke orker at kode lige her”.</a:t>
             </a:r>
           </a:p>
           <a:p>
@@ -2910,13 +2910,6 @@
               <a:rPr lang="en-US" dirty="0"/>
               <a:t> Java</a:t>
             </a:r>
-          </a:p>
-          <a:p>
-            <a:r>
-              <a:rPr lang="en-US" dirty="0" err="1"/>
-              <a:t>Pauser</a:t>
-            </a:r>
-            <a:endParaRPr lang="en-US" dirty="0"/>
           </a:p>
           <a:p>
             <a:r>

</xml_diff>